<commit_message>
# custom coloured barplots function added
</commit_message>
<xml_diff>
--- a/Figures_draft/Figures_Plan_v1_1_JT.pptx
+++ b/Figures_draft/Figures_Plan_v1_1_JT.pptx
@@ -5,7 +5,7 @@
     <p:sldMasterId id="2147483648" r:id="rId1"/>
   </p:sldMasterIdLst>
   <p:notesMasterIdLst>
-    <p:notesMasterId r:id="rId14"/>
+    <p:notesMasterId r:id="rId11"/>
   </p:notesMasterIdLst>
   <p:sldIdLst>
     <p:sldId id="257" r:id="rId2"/>
@@ -17,9 +17,6 @@
     <p:sldId id="292" r:id="rId8"/>
     <p:sldId id="263" r:id="rId9"/>
     <p:sldId id="290" r:id="rId10"/>
-    <p:sldId id="287" r:id="rId11"/>
-    <p:sldId id="260" r:id="rId12"/>
-    <p:sldId id="262" r:id="rId13"/>
   </p:sldIdLst>
   <p:sldSz cx="6858000" cy="9906000" type="A4"/>
   <p:notesSz cx="6858000" cy="9144000"/>
@@ -208,7 +205,7 @@
           <a:p>
             <a:fld id="{D3A6DE65-833D-4C51-A0FD-E57ACE3AF32D}" type="datetimeFigureOut">
               <a:rPr lang="en-GB" smtClean="0"/>
-              <a:t>15/03/2024</a:t>
+              <a:t>18/03/2024</a:t>
             </a:fld>
             <a:endParaRPr lang="en-GB"/>
           </a:p>
@@ -1062,90 +1059,6 @@
 </p:notes>
 </file>
 
-<file path=ppt/notesSlides/notesSlide6.xml><?xml version="1.0" encoding="utf-8"?>
-<p:notes xmlns:a="http://schemas.openxmlformats.org/drawingml/2006/main" xmlns:r="http://schemas.openxmlformats.org/officeDocument/2006/relationships" xmlns:p="http://schemas.openxmlformats.org/presentationml/2006/main">
-  <p:cSld>
-    <p:spTree>
-      <p:nvGrpSpPr>
-        <p:cNvPr id="1" name=""/>
-        <p:cNvGrpSpPr/>
-        <p:nvPr/>
-      </p:nvGrpSpPr>
-      <p:grpSpPr>
-        <a:xfrm>
-          <a:off x="0" y="0"/>
-          <a:ext cx="0" cy="0"/>
-          <a:chOff x="0" y="0"/>
-          <a:chExt cx="0" cy="0"/>
-        </a:xfrm>
-      </p:grpSpPr>
-      <p:sp>
-        <p:nvSpPr>
-          <p:cNvPr id="2" name="Slide Image Placeholder 1"/>
-          <p:cNvSpPr>
-            <a:spLocks noGrp="1" noRot="1" noChangeAspect="1"/>
-          </p:cNvSpPr>
-          <p:nvPr>
-            <p:ph type="sldImg"/>
-          </p:nvPr>
-        </p:nvSpPr>
-        <p:spPr/>
-      </p:sp>
-      <p:sp>
-        <p:nvSpPr>
-          <p:cNvPr id="3" name="Notes Placeholder 2"/>
-          <p:cNvSpPr>
-            <a:spLocks noGrp="1"/>
-          </p:cNvSpPr>
-          <p:nvPr>
-            <p:ph type="body" idx="1"/>
-          </p:nvPr>
-        </p:nvSpPr>
-        <p:spPr/>
-        <p:txBody>
-          <a:bodyPr/>
-          <a:lstStyle/>
-          <a:p>
-            <a:endParaRPr lang="en-GB" dirty="0"/>
-          </a:p>
-        </p:txBody>
-      </p:sp>
-      <p:sp>
-        <p:nvSpPr>
-          <p:cNvPr id="4" name="Slide Number Placeholder 3"/>
-          <p:cNvSpPr>
-            <a:spLocks noGrp="1"/>
-          </p:cNvSpPr>
-          <p:nvPr>
-            <p:ph type="sldNum" sz="quarter" idx="5"/>
-          </p:nvPr>
-        </p:nvSpPr>
-        <p:spPr/>
-        <p:txBody>
-          <a:bodyPr/>
-          <a:lstStyle/>
-          <a:p>
-            <a:fld id="{12039498-F300-4EE7-9928-3851DEB95EBD}" type="slidenum">
-              <a:rPr lang="en-GB" smtClean="0"/>
-              <a:t>11</a:t>
-            </a:fld>
-            <a:endParaRPr lang="en-GB"/>
-          </a:p>
-        </p:txBody>
-      </p:sp>
-    </p:spTree>
-    <p:extLst>
-      <p:ext uri="{BB962C8B-B14F-4D97-AF65-F5344CB8AC3E}">
-        <p14:creationId xmlns:p14="http://schemas.microsoft.com/office/powerpoint/2010/main" val="2742403540"/>
-      </p:ext>
-    </p:extLst>
-  </p:cSld>
-  <p:clrMapOvr>
-    <a:masterClrMapping/>
-  </p:clrMapOvr>
-</p:notes>
-</file>
-
 <file path=ppt/slideLayouts/slideLayout1.xml><?xml version="1.0" encoding="utf-8"?>
 <p:sldLayout xmlns:a="http://schemas.openxmlformats.org/drawingml/2006/main" xmlns:r="http://schemas.openxmlformats.org/officeDocument/2006/relationships" xmlns:p="http://schemas.openxmlformats.org/presentationml/2006/main" type="title" preserve="1">
   <p:cSld name="Title Slide">
@@ -1293,7 +1206,7 @@
           <a:p>
             <a:fld id="{E2FEBA0D-BB35-4739-9D24-45F824C918E8}" type="datetimeFigureOut">
               <a:rPr lang="en-GB" smtClean="0"/>
-              <a:t>15/03/2024</a:t>
+              <a:t>18/03/2024</a:t>
             </a:fld>
             <a:endParaRPr lang="en-GB"/>
           </a:p>
@@ -1491,7 +1404,7 @@
           <a:p>
             <a:fld id="{E2FEBA0D-BB35-4739-9D24-45F824C918E8}" type="datetimeFigureOut">
               <a:rPr lang="en-GB" smtClean="0"/>
-              <a:t>15/03/2024</a:t>
+              <a:t>18/03/2024</a:t>
             </a:fld>
             <a:endParaRPr lang="en-GB"/>
           </a:p>
@@ -1699,7 +1612,7 @@
           <a:p>
             <a:fld id="{E2FEBA0D-BB35-4739-9D24-45F824C918E8}" type="datetimeFigureOut">
               <a:rPr lang="en-GB" smtClean="0"/>
-              <a:t>15/03/2024</a:t>
+              <a:t>18/03/2024</a:t>
             </a:fld>
             <a:endParaRPr lang="en-GB"/>
           </a:p>
@@ -1897,7 +1810,7 @@
           <a:p>
             <a:fld id="{E2FEBA0D-BB35-4739-9D24-45F824C918E8}" type="datetimeFigureOut">
               <a:rPr lang="en-GB" smtClean="0"/>
-              <a:t>15/03/2024</a:t>
+              <a:t>18/03/2024</a:t>
             </a:fld>
             <a:endParaRPr lang="en-GB"/>
           </a:p>
@@ -2172,7 +2085,7 @@
           <a:p>
             <a:fld id="{E2FEBA0D-BB35-4739-9D24-45F824C918E8}" type="datetimeFigureOut">
               <a:rPr lang="en-GB" smtClean="0"/>
-              <a:t>15/03/2024</a:t>
+              <a:t>18/03/2024</a:t>
             </a:fld>
             <a:endParaRPr lang="en-GB"/>
           </a:p>
@@ -2437,7 +2350,7 @@
           <a:p>
             <a:fld id="{E2FEBA0D-BB35-4739-9D24-45F824C918E8}" type="datetimeFigureOut">
               <a:rPr lang="en-GB" smtClean="0"/>
-              <a:t>15/03/2024</a:t>
+              <a:t>18/03/2024</a:t>
             </a:fld>
             <a:endParaRPr lang="en-GB"/>
           </a:p>
@@ -2849,7 +2762,7 @@
           <a:p>
             <a:fld id="{E2FEBA0D-BB35-4739-9D24-45F824C918E8}" type="datetimeFigureOut">
               <a:rPr lang="en-GB" smtClean="0"/>
-              <a:t>15/03/2024</a:t>
+              <a:t>18/03/2024</a:t>
             </a:fld>
             <a:endParaRPr lang="en-GB"/>
           </a:p>
@@ -2990,7 +2903,7 @@
           <a:p>
             <a:fld id="{E2FEBA0D-BB35-4739-9D24-45F824C918E8}" type="datetimeFigureOut">
               <a:rPr lang="en-GB" smtClean="0"/>
-              <a:t>15/03/2024</a:t>
+              <a:t>18/03/2024</a:t>
             </a:fld>
             <a:endParaRPr lang="en-GB"/>
           </a:p>
@@ -3103,7 +3016,7 @@
           <a:p>
             <a:fld id="{E2FEBA0D-BB35-4739-9D24-45F824C918E8}" type="datetimeFigureOut">
               <a:rPr lang="en-GB" smtClean="0"/>
-              <a:t>15/03/2024</a:t>
+              <a:t>18/03/2024</a:t>
             </a:fld>
             <a:endParaRPr lang="en-GB"/>
           </a:p>
@@ -3414,7 +3327,7 @@
           <a:p>
             <a:fld id="{E2FEBA0D-BB35-4739-9D24-45F824C918E8}" type="datetimeFigureOut">
               <a:rPr lang="en-GB" smtClean="0"/>
-              <a:t>15/03/2024</a:t>
+              <a:t>18/03/2024</a:t>
             </a:fld>
             <a:endParaRPr lang="en-GB"/>
           </a:p>
@@ -3702,7 +3615,7 @@
           <a:p>
             <a:fld id="{E2FEBA0D-BB35-4739-9D24-45F824C918E8}" type="datetimeFigureOut">
               <a:rPr lang="en-GB" smtClean="0"/>
-              <a:t>15/03/2024</a:t>
+              <a:t>18/03/2024</a:t>
             </a:fld>
             <a:endParaRPr lang="en-GB"/>
           </a:p>
@@ -3943,7 +3856,7 @@
           <a:p>
             <a:fld id="{E2FEBA0D-BB35-4739-9D24-45F824C918E8}" type="datetimeFigureOut">
               <a:rPr lang="en-GB" smtClean="0"/>
-              <a:t>15/03/2024</a:t>
+              <a:t>18/03/2024</a:t>
             </a:fld>
             <a:endParaRPr lang="en-GB"/>
           </a:p>
@@ -6070,1652 +5983,6 @@
     <p:extLst>
       <p:ext uri="{BB962C8B-B14F-4D97-AF65-F5344CB8AC3E}">
         <p14:creationId xmlns:p14="http://schemas.microsoft.com/office/powerpoint/2010/main" val="1436019521"/>
-      </p:ext>
-    </p:extLst>
-  </p:cSld>
-  <p:clrMapOvr>
-    <a:masterClrMapping/>
-  </p:clrMapOvr>
-</p:sld>
-</file>
-
-<file path=ppt/slides/slide10.xml><?xml version="1.0" encoding="utf-8"?>
-<p:sld xmlns:a="http://schemas.openxmlformats.org/drawingml/2006/main" xmlns:r="http://schemas.openxmlformats.org/officeDocument/2006/relationships" xmlns:p="http://schemas.openxmlformats.org/presentationml/2006/main" show="0">
-  <p:cSld>
-    <p:spTree>
-      <p:nvGrpSpPr>
-        <p:cNvPr id="1" name="">
-          <a:extLst>
-            <a:ext uri="{FF2B5EF4-FFF2-40B4-BE49-F238E27FC236}">
-              <a16:creationId xmlns:a16="http://schemas.microsoft.com/office/drawing/2014/main" id="{45B5DF0D-16DB-DAC9-C259-4899839C3D1A}"/>
-            </a:ext>
-          </a:extLst>
-        </p:cNvPr>
-        <p:cNvGrpSpPr/>
-        <p:nvPr/>
-      </p:nvGrpSpPr>
-      <p:grpSpPr>
-        <a:xfrm>
-          <a:off x="0" y="0"/>
-          <a:ext cx="0" cy="0"/>
-          <a:chOff x="0" y="0"/>
-          <a:chExt cx="0" cy="0"/>
-        </a:xfrm>
-      </p:grpSpPr>
-      <p:sp>
-        <p:nvSpPr>
-          <p:cNvPr id="5" name="Rectangle 4">
-            <a:extLst>
-              <a:ext uri="{FF2B5EF4-FFF2-40B4-BE49-F238E27FC236}">
-                <a16:creationId xmlns:a16="http://schemas.microsoft.com/office/drawing/2014/main" id="{BB9B2425-123B-7CA7-385B-4F743C11660A}"/>
-              </a:ext>
-            </a:extLst>
-          </p:cNvPr>
-          <p:cNvSpPr/>
-          <p:nvPr/>
-        </p:nvSpPr>
-        <p:spPr>
-          <a:xfrm>
-            <a:off x="60767" y="742687"/>
-            <a:ext cx="6688178" cy="937980"/>
-          </a:xfrm>
-          <a:prstGeom prst="rect">
-            <a:avLst/>
-          </a:prstGeom>
-          <a:noFill/>
-          <a:ln w="38100">
-            <a:solidFill>
-              <a:srgbClr val="7F7F7F"/>
-            </a:solidFill>
-          </a:ln>
-        </p:spPr>
-        <p:style>
-          <a:lnRef idx="2">
-            <a:schemeClr val="accent1">
-              <a:shade val="15000"/>
-            </a:schemeClr>
-          </a:lnRef>
-          <a:fillRef idx="1">
-            <a:schemeClr val="accent1"/>
-          </a:fillRef>
-          <a:effectRef idx="0">
-            <a:schemeClr val="accent1"/>
-          </a:effectRef>
-          <a:fontRef idx="minor">
-            <a:schemeClr val="lt1"/>
-          </a:fontRef>
-        </p:style>
-        <p:txBody>
-          <a:bodyPr rtlCol="0" anchor="ctr"/>
-          <a:lstStyle/>
-          <a:p>
-            <a:pPr algn="ctr"/>
-            <a:r>
-              <a:rPr lang="en-GB" sz="1575" b="1" dirty="0">
-                <a:solidFill>
-                  <a:schemeClr val="tx1"/>
-                </a:solidFill>
-                <a:latin typeface="Arial" panose="020B0604020202020204" pitchFamily="34" charset="0"/>
-                <a:cs typeface="Arial" panose="020B0604020202020204" pitchFamily="34" charset="0"/>
-              </a:rPr>
-              <a:t>Tyrosine-containing</a:t>
-            </a:r>
-            <a:r>
-              <a:rPr lang="en-GB" sz="1125" b="1" dirty="0">
-                <a:solidFill>
-                  <a:schemeClr val="tx1"/>
-                </a:solidFill>
-                <a:latin typeface="Arial" panose="020B0604020202020204" pitchFamily="34" charset="0"/>
-                <a:cs typeface="Arial" panose="020B0604020202020204" pitchFamily="34" charset="0"/>
-              </a:rPr>
-              <a:t> phosphorylated peptidoforms</a:t>
-            </a:r>
-          </a:p>
-          <a:p>
-            <a:pPr algn="ctr"/>
-            <a:r>
-              <a:rPr lang="en-GB" sz="1575" b="1" dirty="0">
-                <a:solidFill>
-                  <a:schemeClr val="tx1"/>
-                </a:solidFill>
-                <a:latin typeface="Arial" panose="020B0604020202020204" pitchFamily="34" charset="0"/>
-                <a:cs typeface="Arial" panose="020B0604020202020204" pitchFamily="34" charset="0"/>
-              </a:rPr>
-              <a:t>(not </a:t>
-            </a:r>
-            <a:r>
-              <a:rPr lang="en-GB" sz="1575" b="1" dirty="0" err="1">
-                <a:solidFill>
-                  <a:schemeClr val="tx1"/>
-                </a:solidFill>
-                <a:latin typeface="Arial" panose="020B0604020202020204" pitchFamily="34" charset="0"/>
-                <a:cs typeface="Arial" panose="020B0604020202020204" pitchFamily="34" charset="0"/>
-              </a:rPr>
-              <a:t>pY</a:t>
-            </a:r>
-            <a:r>
-              <a:rPr lang="en-GB" sz="1575" b="1" dirty="0">
-                <a:solidFill>
-                  <a:schemeClr val="tx1"/>
-                </a:solidFill>
-                <a:latin typeface="Arial" panose="020B0604020202020204" pitchFamily="34" charset="0"/>
-                <a:cs typeface="Arial" panose="020B0604020202020204" pitchFamily="34" charset="0"/>
-              </a:rPr>
-              <a:t>): </a:t>
-            </a:r>
-            <a:r>
-              <a:rPr lang="en-GB" sz="1125" b="1" dirty="0">
-                <a:solidFill>
-                  <a:schemeClr val="tx1"/>
-                </a:solidFill>
-                <a:latin typeface="Arial" panose="020B0604020202020204" pitchFamily="34" charset="0"/>
-                <a:cs typeface="Arial" panose="020B0604020202020204" pitchFamily="34" charset="0"/>
-              </a:rPr>
-              <a:t>some PTMs might be mis-assigned to incorrect amino acid and we’ve not done FDR thresholding on this (</a:t>
-            </a:r>
-            <a:r>
-              <a:rPr lang="en-GB" sz="1125" dirty="0">
-                <a:solidFill>
-                  <a:schemeClr val="tx1"/>
-                </a:solidFill>
-                <a:latin typeface="Arial" panose="020B0604020202020204" pitchFamily="34" charset="0"/>
-                <a:cs typeface="Arial" panose="020B0604020202020204" pitchFamily="34" charset="0"/>
-              </a:rPr>
-              <a:t>don’t fully understand assignment but it’s based on PTM prophet; Andy advised to go with Y-containing </a:t>
-            </a:r>
-            <a:r>
-              <a:rPr lang="en-GB" sz="1125" b="1" dirty="0">
-                <a:solidFill>
-                  <a:schemeClr val="tx1"/>
-                </a:solidFill>
-                <a:latin typeface="Arial" panose="020B0604020202020204" pitchFamily="34" charset="0"/>
-                <a:cs typeface="Arial" panose="020B0604020202020204" pitchFamily="34" charset="0"/>
-              </a:rPr>
-              <a:t>) </a:t>
-            </a:r>
-            <a:endParaRPr lang="en-GB" sz="450" dirty="0">
-              <a:solidFill>
-                <a:schemeClr val="tx1"/>
-              </a:solidFill>
-              <a:latin typeface="Arial" panose="020B0604020202020204" pitchFamily="34" charset="0"/>
-              <a:cs typeface="Arial" panose="020B0604020202020204" pitchFamily="34" charset="0"/>
-            </a:endParaRPr>
-          </a:p>
-        </p:txBody>
-      </p:sp>
-      <p:sp>
-        <p:nvSpPr>
-          <p:cNvPr id="7" name="Rectangle 6">
-            <a:extLst>
-              <a:ext uri="{FF2B5EF4-FFF2-40B4-BE49-F238E27FC236}">
-                <a16:creationId xmlns:a16="http://schemas.microsoft.com/office/drawing/2014/main" id="{977C9530-2CB1-2AF0-560E-4066A93051C2}"/>
-              </a:ext>
-            </a:extLst>
-          </p:cNvPr>
-          <p:cNvSpPr/>
-          <p:nvPr/>
-        </p:nvSpPr>
-        <p:spPr>
-          <a:xfrm>
-            <a:off x="2343331" y="1807084"/>
-            <a:ext cx="2171339" cy="937980"/>
-          </a:xfrm>
-          <a:prstGeom prst="rect">
-            <a:avLst/>
-          </a:prstGeom>
-          <a:noFill/>
-          <a:ln w="38100">
-            <a:solidFill>
-              <a:srgbClr val="00B0F0"/>
-            </a:solidFill>
-          </a:ln>
-        </p:spPr>
-        <p:style>
-          <a:lnRef idx="2">
-            <a:schemeClr val="accent1">
-              <a:shade val="15000"/>
-            </a:schemeClr>
-          </a:lnRef>
-          <a:fillRef idx="1">
-            <a:schemeClr val="accent1"/>
-          </a:fillRef>
-          <a:effectRef idx="0">
-            <a:schemeClr val="accent1"/>
-          </a:effectRef>
-          <a:fontRef idx="minor">
-            <a:schemeClr val="lt1"/>
-          </a:fontRef>
-        </p:style>
-        <p:txBody>
-          <a:bodyPr rtlCol="0" anchor="ctr"/>
-          <a:lstStyle/>
-          <a:p>
-            <a:pPr algn="ctr"/>
-            <a:r>
-              <a:rPr lang="en-GB" sz="1575" b="1" dirty="0">
-                <a:solidFill>
-                  <a:schemeClr val="tx1"/>
-                </a:solidFill>
-                <a:latin typeface="Arial" panose="020B0604020202020204" pitchFamily="34" charset="0"/>
-                <a:cs typeface="Arial" panose="020B0604020202020204" pitchFamily="34" charset="0"/>
-              </a:rPr>
-              <a:t>DECOY Foreground:</a:t>
-            </a:r>
-          </a:p>
-          <a:p>
-            <a:pPr algn="ctr"/>
-            <a:r>
-              <a:rPr lang="en-GB" sz="1575" b="1" dirty="0">
-                <a:solidFill>
-                  <a:schemeClr val="tx1"/>
-                </a:solidFill>
-                <a:latin typeface="Arial" panose="020B0604020202020204" pitchFamily="34" charset="0"/>
-                <a:cs typeface="Arial" panose="020B0604020202020204" pitchFamily="34" charset="0"/>
-              </a:rPr>
-              <a:t>Y-containing in </a:t>
-            </a:r>
-          </a:p>
-          <a:p>
-            <a:pPr algn="ctr"/>
-            <a:r>
-              <a:rPr lang="en-GB" sz="1575" b="1" dirty="0">
-                <a:solidFill>
-                  <a:schemeClr val="tx1"/>
-                </a:solidFill>
-                <a:latin typeface="Arial" panose="020B0604020202020204" pitchFamily="34" charset="0"/>
-                <a:cs typeface="Arial" panose="020B0604020202020204" pitchFamily="34" charset="0"/>
-              </a:rPr>
-              <a:t>DECOY Bin(s)</a:t>
-            </a:r>
-            <a:endParaRPr lang="en-GB" sz="1125" b="1" dirty="0">
-              <a:solidFill>
-                <a:schemeClr val="tx1"/>
-              </a:solidFill>
-              <a:latin typeface="Arial" panose="020B0604020202020204" pitchFamily="34" charset="0"/>
-              <a:cs typeface="Arial" panose="020B0604020202020204" pitchFamily="34" charset="0"/>
-            </a:endParaRPr>
-          </a:p>
-        </p:txBody>
-      </p:sp>
-      <p:sp>
-        <p:nvSpPr>
-          <p:cNvPr id="8" name="Rectangle 7">
-            <a:extLst>
-              <a:ext uri="{FF2B5EF4-FFF2-40B4-BE49-F238E27FC236}">
-                <a16:creationId xmlns:a16="http://schemas.microsoft.com/office/drawing/2014/main" id="{214BF69B-4F5D-A2EA-C9C6-31300407D0A5}"/>
-              </a:ext>
-            </a:extLst>
-          </p:cNvPr>
-          <p:cNvSpPr/>
-          <p:nvPr/>
-        </p:nvSpPr>
-        <p:spPr>
-          <a:xfrm>
-            <a:off x="60767" y="1807084"/>
-            <a:ext cx="2171339" cy="937980"/>
-          </a:xfrm>
-          <a:prstGeom prst="rect">
-            <a:avLst/>
-          </a:prstGeom>
-          <a:noFill/>
-          <a:ln w="38100">
-            <a:solidFill>
-              <a:schemeClr val="accent2"/>
-            </a:solidFill>
-          </a:ln>
-        </p:spPr>
-        <p:style>
-          <a:lnRef idx="2">
-            <a:schemeClr val="accent1">
-              <a:shade val="15000"/>
-            </a:schemeClr>
-          </a:lnRef>
-          <a:fillRef idx="1">
-            <a:schemeClr val="accent1"/>
-          </a:fillRef>
-          <a:effectRef idx="0">
-            <a:schemeClr val="accent1"/>
-          </a:effectRef>
-          <a:fontRef idx="minor">
-            <a:schemeClr val="lt1"/>
-          </a:fontRef>
-        </p:style>
-        <p:txBody>
-          <a:bodyPr rtlCol="0" anchor="ctr"/>
-          <a:lstStyle/>
-          <a:p>
-            <a:pPr algn="ctr"/>
-            <a:r>
-              <a:rPr lang="en-GB" sz="1575" b="1" dirty="0">
-                <a:solidFill>
-                  <a:schemeClr val="tx1"/>
-                </a:solidFill>
-                <a:latin typeface="Arial" panose="020B0604020202020204" pitchFamily="34" charset="0"/>
-                <a:cs typeface="Arial" panose="020B0604020202020204" pitchFamily="34" charset="0"/>
-              </a:rPr>
-              <a:t>Foreground:</a:t>
-            </a:r>
-          </a:p>
-          <a:p>
-            <a:pPr algn="ctr"/>
-            <a:r>
-              <a:rPr lang="en-GB" sz="1575" b="1" dirty="0">
-                <a:solidFill>
-                  <a:schemeClr val="tx1"/>
-                </a:solidFill>
-                <a:latin typeface="Arial" panose="020B0604020202020204" pitchFamily="34" charset="0"/>
-                <a:cs typeface="Arial" panose="020B0604020202020204" pitchFamily="34" charset="0"/>
-              </a:rPr>
-              <a:t>Y-containing in </a:t>
-            </a:r>
-          </a:p>
-          <a:p>
-            <a:pPr algn="ctr"/>
-            <a:r>
-              <a:rPr lang="en-GB" sz="1575" b="1" dirty="0">
-                <a:solidFill>
-                  <a:schemeClr val="tx1"/>
-                </a:solidFill>
-                <a:latin typeface="Arial" panose="020B0604020202020204" pitchFamily="34" charset="0"/>
-                <a:cs typeface="Arial" panose="020B0604020202020204" pitchFamily="34" charset="0"/>
-              </a:rPr>
-              <a:t>Bin of interest</a:t>
-            </a:r>
-            <a:endParaRPr lang="en-GB" sz="1125" b="1" dirty="0">
-              <a:solidFill>
-                <a:schemeClr val="tx1"/>
-              </a:solidFill>
-              <a:latin typeface="Arial" panose="020B0604020202020204" pitchFamily="34" charset="0"/>
-              <a:cs typeface="Arial" panose="020B0604020202020204" pitchFamily="34" charset="0"/>
-            </a:endParaRPr>
-          </a:p>
-        </p:txBody>
-      </p:sp>
-      <p:sp>
-        <p:nvSpPr>
-          <p:cNvPr id="9" name="Rectangle 8">
-            <a:extLst>
-              <a:ext uri="{FF2B5EF4-FFF2-40B4-BE49-F238E27FC236}">
-                <a16:creationId xmlns:a16="http://schemas.microsoft.com/office/drawing/2014/main" id="{4DED7CAA-FF73-353C-116B-ED3F5E875DDB}"/>
-              </a:ext>
-            </a:extLst>
-          </p:cNvPr>
-          <p:cNvSpPr/>
-          <p:nvPr/>
-        </p:nvSpPr>
-        <p:spPr>
-          <a:xfrm>
-            <a:off x="4577606" y="1807084"/>
-            <a:ext cx="2171339" cy="937980"/>
-          </a:xfrm>
-          <a:prstGeom prst="rect">
-            <a:avLst/>
-          </a:prstGeom>
-          <a:noFill/>
-          <a:ln w="38100">
-            <a:solidFill>
-              <a:schemeClr val="tx1"/>
-            </a:solidFill>
-          </a:ln>
-        </p:spPr>
-        <p:style>
-          <a:lnRef idx="2">
-            <a:schemeClr val="accent1">
-              <a:shade val="15000"/>
-            </a:schemeClr>
-          </a:lnRef>
-          <a:fillRef idx="1">
-            <a:schemeClr val="accent1"/>
-          </a:fillRef>
-          <a:effectRef idx="0">
-            <a:schemeClr val="accent1"/>
-          </a:effectRef>
-          <a:fontRef idx="minor">
-            <a:schemeClr val="lt1"/>
-          </a:fontRef>
-        </p:style>
-        <p:txBody>
-          <a:bodyPr rtlCol="0" anchor="ctr"/>
-          <a:lstStyle/>
-          <a:p>
-            <a:pPr algn="ctr"/>
-            <a:r>
-              <a:rPr lang="en-GB" sz="1575" b="1" dirty="0">
-                <a:solidFill>
-                  <a:schemeClr val="tx1"/>
-                </a:solidFill>
-                <a:latin typeface="Arial" panose="020B0604020202020204" pitchFamily="34" charset="0"/>
-                <a:cs typeface="Arial" panose="020B0604020202020204" pitchFamily="34" charset="0"/>
-              </a:rPr>
-              <a:t>Background:</a:t>
-            </a:r>
-          </a:p>
-          <a:p>
-            <a:pPr algn="ctr"/>
-            <a:r>
-              <a:rPr lang="en-GB" sz="1575" b="1" dirty="0">
-                <a:solidFill>
-                  <a:schemeClr val="tx1"/>
-                </a:solidFill>
-                <a:latin typeface="Arial" panose="020B0604020202020204" pitchFamily="34" charset="0"/>
-                <a:cs typeface="Arial" panose="020B0604020202020204" pitchFamily="34" charset="0"/>
-              </a:rPr>
-              <a:t>Y-containing in </a:t>
-            </a:r>
-          </a:p>
-          <a:p>
-            <a:pPr algn="ctr"/>
-            <a:r>
-              <a:rPr lang="en-GB" sz="1575" b="1" dirty="0">
-                <a:solidFill>
-                  <a:schemeClr val="tx1"/>
-                </a:solidFill>
-                <a:latin typeface="Arial" panose="020B0604020202020204" pitchFamily="34" charset="0"/>
-                <a:cs typeface="Arial" panose="020B0604020202020204" pitchFamily="34" charset="0"/>
-              </a:rPr>
-              <a:t>all bins</a:t>
-            </a:r>
-            <a:endParaRPr lang="en-GB" sz="1125" b="1" dirty="0">
-              <a:solidFill>
-                <a:schemeClr val="tx1"/>
-              </a:solidFill>
-              <a:latin typeface="Arial" panose="020B0604020202020204" pitchFamily="34" charset="0"/>
-              <a:cs typeface="Arial" panose="020B0604020202020204" pitchFamily="34" charset="0"/>
-            </a:endParaRPr>
-          </a:p>
-        </p:txBody>
-      </p:sp>
-      <p:cxnSp>
-        <p:nvCxnSpPr>
-          <p:cNvPr id="11" name="Straight Arrow Connector 10">
-            <a:extLst>
-              <a:ext uri="{FF2B5EF4-FFF2-40B4-BE49-F238E27FC236}">
-                <a16:creationId xmlns:a16="http://schemas.microsoft.com/office/drawing/2014/main" id="{20F845B9-3480-744B-B1A2-4B9E45967726}"/>
-              </a:ext>
-            </a:extLst>
-          </p:cNvPr>
-          <p:cNvCxnSpPr>
-            <a:cxnSpLocks/>
-          </p:cNvCxnSpPr>
-          <p:nvPr/>
-        </p:nvCxnSpPr>
-        <p:spPr>
-          <a:xfrm>
-            <a:off x="3429000" y="2852603"/>
-            <a:ext cx="0" cy="397156"/>
-          </a:xfrm>
-          <a:prstGeom prst="straightConnector1">
-            <a:avLst/>
-          </a:prstGeom>
-          <a:ln w="127000">
-            <a:tailEnd type="triangle"/>
-          </a:ln>
-        </p:spPr>
-        <p:style>
-          <a:lnRef idx="1">
-            <a:schemeClr val="dk1"/>
-          </a:lnRef>
-          <a:fillRef idx="0">
-            <a:schemeClr val="dk1"/>
-          </a:fillRef>
-          <a:effectRef idx="0">
-            <a:schemeClr val="dk1"/>
-          </a:effectRef>
-          <a:fontRef idx="minor">
-            <a:schemeClr val="tx1"/>
-          </a:fontRef>
-        </p:style>
-      </p:cxnSp>
-      <p:sp>
-        <p:nvSpPr>
-          <p:cNvPr id="12" name="Rectangle 11">
-            <a:extLst>
-              <a:ext uri="{FF2B5EF4-FFF2-40B4-BE49-F238E27FC236}">
-                <a16:creationId xmlns:a16="http://schemas.microsoft.com/office/drawing/2014/main" id="{1A3A790B-25AC-0B55-CAA4-7765B8480C94}"/>
-              </a:ext>
-            </a:extLst>
-          </p:cNvPr>
-          <p:cNvSpPr/>
-          <p:nvPr/>
-        </p:nvSpPr>
-        <p:spPr>
-          <a:xfrm>
-            <a:off x="60767" y="3086990"/>
-            <a:ext cx="6688176" cy="937980"/>
-          </a:xfrm>
-          <a:prstGeom prst="rect">
-            <a:avLst/>
-          </a:prstGeom>
-          <a:noFill/>
-          <a:ln w="38100">
-            <a:noFill/>
-          </a:ln>
-        </p:spPr>
-        <p:style>
-          <a:lnRef idx="2">
-            <a:schemeClr val="accent1">
-              <a:shade val="15000"/>
-            </a:schemeClr>
-          </a:lnRef>
-          <a:fillRef idx="1">
-            <a:schemeClr val="accent1"/>
-          </a:fillRef>
-          <a:effectRef idx="0">
-            <a:schemeClr val="accent1"/>
-          </a:effectRef>
-          <a:fontRef idx="minor">
-            <a:schemeClr val="lt1"/>
-          </a:fontRef>
-        </p:style>
-        <p:txBody>
-          <a:bodyPr rtlCol="0" anchor="ctr"/>
-          <a:lstStyle/>
-          <a:p>
-            <a:pPr algn="ctr"/>
-            <a:r>
-              <a:rPr lang="en-GB" sz="1575" b="1" dirty="0">
-                <a:solidFill>
-                  <a:schemeClr val="tx1"/>
-                </a:solidFill>
-                <a:latin typeface="Arial" panose="020B0604020202020204" pitchFamily="34" charset="0"/>
-                <a:cs typeface="Arial" panose="020B0604020202020204" pitchFamily="34" charset="0"/>
-              </a:rPr>
-              <a:t>Only include peptidoforms with assigned protein IDs that are part of </a:t>
-            </a:r>
-            <a:r>
-              <a:rPr lang="en-GB" sz="1575" b="1" dirty="0" err="1">
-                <a:solidFill>
-                  <a:schemeClr val="tx1"/>
-                </a:solidFill>
-                <a:latin typeface="Arial" panose="020B0604020202020204" pitchFamily="34" charset="0"/>
-                <a:cs typeface="Arial" panose="020B0604020202020204" pitchFamily="34" charset="0"/>
-              </a:rPr>
-              <a:t>SwissProt</a:t>
-            </a:r>
-            <a:r>
-              <a:rPr lang="en-GB" sz="1575" b="1" dirty="0">
-                <a:solidFill>
-                  <a:schemeClr val="tx1"/>
-                </a:solidFill>
-                <a:latin typeface="Arial" panose="020B0604020202020204" pitchFamily="34" charset="0"/>
-                <a:cs typeface="Arial" panose="020B0604020202020204" pitchFamily="34" charset="0"/>
-              </a:rPr>
-              <a:t> (reviewed human proteome, ~20,000 proteins)</a:t>
-            </a:r>
-          </a:p>
-        </p:txBody>
-      </p:sp>
-      <p:sp>
-        <p:nvSpPr>
-          <p:cNvPr id="2" name="Title 1">
-            <a:extLst>
-              <a:ext uri="{FF2B5EF4-FFF2-40B4-BE49-F238E27FC236}">
-                <a16:creationId xmlns:a16="http://schemas.microsoft.com/office/drawing/2014/main" id="{656AA54C-3C37-BAC8-B9D5-8BC4B6281263}"/>
-              </a:ext>
-            </a:extLst>
-          </p:cNvPr>
-          <p:cNvSpPr txBox="1">
-            <a:spLocks/>
-          </p:cNvSpPr>
-          <p:nvPr/>
-        </p:nvSpPr>
-        <p:spPr>
-          <a:xfrm>
-            <a:off x="0" y="0"/>
-            <a:ext cx="6819603" cy="745629"/>
-          </a:xfrm>
-          <a:prstGeom prst="rect">
-            <a:avLst/>
-          </a:prstGeom>
-        </p:spPr>
-        <p:txBody>
-          <a:bodyPr vert="horz" lIns="51435" tIns="25718" rIns="51435" bIns="25718" rtlCol="0" anchor="ctr">
-            <a:normAutofit/>
-          </a:bodyPr>
-          <a:lstStyle>
-            <a:lvl1pPr algn="l" defTabSz="914400" rtl="0" eaLnBrk="1" latinLnBrk="0" hangingPunct="1">
-              <a:lnSpc>
-                <a:spcPct val="90000"/>
-              </a:lnSpc>
-              <a:spcBef>
-                <a:spcPct val="0"/>
-              </a:spcBef>
-              <a:buNone/>
-              <a:defRPr sz="4400" kern="1200">
-                <a:solidFill>
-                  <a:schemeClr val="tx1"/>
-                </a:solidFill>
-                <a:latin typeface="+mj-lt"/>
-                <a:ea typeface="+mj-ea"/>
-                <a:cs typeface="+mj-cs"/>
-              </a:defRPr>
-            </a:lvl1pPr>
-          </a:lstStyle>
-          <a:p>
-            <a:r>
-              <a:rPr lang="en-GB" sz="2025" b="1" dirty="0">
-                <a:latin typeface="Arial" panose="020B0604020202020204" pitchFamily="34" charset="0"/>
-                <a:cs typeface="Arial" panose="020B0604020202020204" pitchFamily="34" charset="0"/>
-              </a:rPr>
-              <a:t>Pathway enrichment - filtering</a:t>
-            </a:r>
-          </a:p>
-        </p:txBody>
-      </p:sp>
-    </p:spTree>
-    <p:extLst>
-      <p:ext uri="{BB962C8B-B14F-4D97-AF65-F5344CB8AC3E}">
-        <p14:creationId xmlns:p14="http://schemas.microsoft.com/office/powerpoint/2010/main" val="2480689442"/>
-      </p:ext>
-    </p:extLst>
-  </p:cSld>
-  <p:clrMapOvr>
-    <a:masterClrMapping/>
-  </p:clrMapOvr>
-  <p:timing>
-    <p:tnLst>
-      <p:par>
-        <p:cTn id="1" dur="indefinite" restart="never" nodeType="tmRoot">
-          <p:childTnLst>
-            <p:seq concurrent="1" nextAc="seek">
-              <p:cTn id="2" dur="indefinite" nodeType="mainSeq">
-                <p:childTnLst>
-                  <p:par>
-                    <p:cTn id="3" fill="hold">
-                      <p:stCondLst>
-                        <p:cond delay="indefinite"/>
-                      </p:stCondLst>
-                      <p:childTnLst>
-                        <p:par>
-                          <p:cTn id="4" fill="hold">
-                            <p:stCondLst>
-                              <p:cond delay="0"/>
-                            </p:stCondLst>
-                            <p:childTnLst>
-                              <p:par>
-                                <p:cTn id="5" presetID="10" presetClass="entr" presetSubtype="0" fill="hold" grpId="0" nodeType="clickEffect">
-                                  <p:stCondLst>
-                                    <p:cond delay="0"/>
-                                  </p:stCondLst>
-                                  <p:childTnLst>
-                                    <p:set>
-                                      <p:cBhvr>
-                                        <p:cTn id="6" dur="1" fill="hold">
-                                          <p:stCondLst>
-                                            <p:cond delay="0"/>
-                                          </p:stCondLst>
-                                        </p:cTn>
-                                        <p:tgtEl>
-                                          <p:spTgt spid="7"/>
-                                        </p:tgtEl>
-                                        <p:attrNameLst>
-                                          <p:attrName>style.visibility</p:attrName>
-                                        </p:attrNameLst>
-                                      </p:cBhvr>
-                                      <p:to>
-                                        <p:strVal val="visible"/>
-                                      </p:to>
-                                    </p:set>
-                                    <p:animEffect transition="in" filter="fade">
-                                      <p:cBhvr>
-                                        <p:cTn id="7" dur="500"/>
-                                        <p:tgtEl>
-                                          <p:spTgt spid="7"/>
-                                        </p:tgtEl>
-                                      </p:cBhvr>
-                                    </p:animEffect>
-                                  </p:childTnLst>
-                                </p:cTn>
-                              </p:par>
-                              <p:par>
-                                <p:cTn id="8" presetID="10" presetClass="entr" presetSubtype="0" fill="hold" grpId="0" nodeType="withEffect">
-                                  <p:stCondLst>
-                                    <p:cond delay="0"/>
-                                  </p:stCondLst>
-                                  <p:childTnLst>
-                                    <p:set>
-                                      <p:cBhvr>
-                                        <p:cTn id="9" dur="1" fill="hold">
-                                          <p:stCondLst>
-                                            <p:cond delay="0"/>
-                                          </p:stCondLst>
-                                        </p:cTn>
-                                        <p:tgtEl>
-                                          <p:spTgt spid="8"/>
-                                        </p:tgtEl>
-                                        <p:attrNameLst>
-                                          <p:attrName>style.visibility</p:attrName>
-                                        </p:attrNameLst>
-                                      </p:cBhvr>
-                                      <p:to>
-                                        <p:strVal val="visible"/>
-                                      </p:to>
-                                    </p:set>
-                                    <p:animEffect transition="in" filter="fade">
-                                      <p:cBhvr>
-                                        <p:cTn id="10" dur="500"/>
-                                        <p:tgtEl>
-                                          <p:spTgt spid="8"/>
-                                        </p:tgtEl>
-                                      </p:cBhvr>
-                                    </p:animEffect>
-                                  </p:childTnLst>
-                                </p:cTn>
-                              </p:par>
-                              <p:par>
-                                <p:cTn id="11" presetID="10" presetClass="entr" presetSubtype="0" fill="hold" grpId="0" nodeType="withEffect">
-                                  <p:stCondLst>
-                                    <p:cond delay="0"/>
-                                  </p:stCondLst>
-                                  <p:childTnLst>
-                                    <p:set>
-                                      <p:cBhvr>
-                                        <p:cTn id="12" dur="1" fill="hold">
-                                          <p:stCondLst>
-                                            <p:cond delay="0"/>
-                                          </p:stCondLst>
-                                        </p:cTn>
-                                        <p:tgtEl>
-                                          <p:spTgt spid="9"/>
-                                        </p:tgtEl>
-                                        <p:attrNameLst>
-                                          <p:attrName>style.visibility</p:attrName>
-                                        </p:attrNameLst>
-                                      </p:cBhvr>
-                                      <p:to>
-                                        <p:strVal val="visible"/>
-                                      </p:to>
-                                    </p:set>
-                                    <p:animEffect transition="in" filter="fade">
-                                      <p:cBhvr>
-                                        <p:cTn id="13" dur="500"/>
-                                        <p:tgtEl>
-                                          <p:spTgt spid="9"/>
-                                        </p:tgtEl>
-                                      </p:cBhvr>
-                                    </p:animEffect>
-                                  </p:childTnLst>
-                                </p:cTn>
-                              </p:par>
-                            </p:childTnLst>
-                          </p:cTn>
-                        </p:par>
-                      </p:childTnLst>
-                    </p:cTn>
-                  </p:par>
-                  <p:par>
-                    <p:cTn id="14" fill="hold">
-                      <p:stCondLst>
-                        <p:cond delay="indefinite"/>
-                      </p:stCondLst>
-                      <p:childTnLst>
-                        <p:par>
-                          <p:cTn id="15" fill="hold">
-                            <p:stCondLst>
-                              <p:cond delay="0"/>
-                            </p:stCondLst>
-                            <p:childTnLst>
-                              <p:par>
-                                <p:cTn id="16" presetID="10" presetClass="entr" presetSubtype="0" fill="hold" grpId="0" nodeType="clickEffect">
-                                  <p:stCondLst>
-                                    <p:cond delay="0"/>
-                                  </p:stCondLst>
-                                  <p:childTnLst>
-                                    <p:set>
-                                      <p:cBhvr>
-                                        <p:cTn id="17" dur="1" fill="hold">
-                                          <p:stCondLst>
-                                            <p:cond delay="0"/>
-                                          </p:stCondLst>
-                                        </p:cTn>
-                                        <p:tgtEl>
-                                          <p:spTgt spid="12"/>
-                                        </p:tgtEl>
-                                        <p:attrNameLst>
-                                          <p:attrName>style.visibility</p:attrName>
-                                        </p:attrNameLst>
-                                      </p:cBhvr>
-                                      <p:to>
-                                        <p:strVal val="visible"/>
-                                      </p:to>
-                                    </p:set>
-                                    <p:animEffect transition="in" filter="fade">
-                                      <p:cBhvr>
-                                        <p:cTn id="18" dur="500"/>
-                                        <p:tgtEl>
-                                          <p:spTgt spid="12"/>
-                                        </p:tgtEl>
-                                      </p:cBhvr>
-                                    </p:animEffect>
-                                  </p:childTnLst>
-                                </p:cTn>
-                              </p:par>
-                              <p:par>
-                                <p:cTn id="19" presetID="10" presetClass="entr" presetSubtype="0" fill="hold" nodeType="withEffect">
-                                  <p:stCondLst>
-                                    <p:cond delay="0"/>
-                                  </p:stCondLst>
-                                  <p:childTnLst>
-                                    <p:set>
-                                      <p:cBhvr>
-                                        <p:cTn id="20" dur="1" fill="hold">
-                                          <p:stCondLst>
-                                            <p:cond delay="0"/>
-                                          </p:stCondLst>
-                                        </p:cTn>
-                                        <p:tgtEl>
-                                          <p:spTgt spid="11"/>
-                                        </p:tgtEl>
-                                        <p:attrNameLst>
-                                          <p:attrName>style.visibility</p:attrName>
-                                        </p:attrNameLst>
-                                      </p:cBhvr>
-                                      <p:to>
-                                        <p:strVal val="visible"/>
-                                      </p:to>
-                                    </p:set>
-                                    <p:animEffect transition="in" filter="fade">
-                                      <p:cBhvr>
-                                        <p:cTn id="21" dur="500"/>
-                                        <p:tgtEl>
-                                          <p:spTgt spid="11"/>
-                                        </p:tgtEl>
-                                      </p:cBhvr>
-                                    </p:animEffect>
-                                  </p:childTnLst>
-                                </p:cTn>
-                              </p:par>
-                            </p:childTnLst>
-                          </p:cTn>
-                        </p:par>
-                      </p:childTnLst>
-                    </p:cTn>
-                  </p:par>
-                </p:childTnLst>
-              </p:cTn>
-              <p:prevCondLst>
-                <p:cond evt="onPrev" delay="0">
-                  <p:tgtEl>
-                    <p:sldTgt/>
-                  </p:tgtEl>
-                </p:cond>
-              </p:prevCondLst>
-              <p:nextCondLst>
-                <p:cond evt="onNext" delay="0">
-                  <p:tgtEl>
-                    <p:sldTgt/>
-                  </p:tgtEl>
-                </p:cond>
-              </p:nextCondLst>
-            </p:seq>
-          </p:childTnLst>
-        </p:cTn>
-      </p:par>
-    </p:tnLst>
-    <p:bldLst>
-      <p:bldP spid="7" grpId="0" animBg="1"/>
-      <p:bldP spid="8" grpId="0" animBg="1"/>
-      <p:bldP spid="9" grpId="0" animBg="1"/>
-      <p:bldP spid="12" grpId="0"/>
-    </p:bldLst>
-  </p:timing>
-</p:sld>
-</file>
-
-<file path=ppt/slides/slide11.xml><?xml version="1.0" encoding="utf-8"?>
-<p:sld xmlns:a="http://schemas.openxmlformats.org/drawingml/2006/main" xmlns:r="http://schemas.openxmlformats.org/officeDocument/2006/relationships" xmlns:p="http://schemas.openxmlformats.org/presentationml/2006/main" show="0">
-  <p:cSld>
-    <p:spTree>
-      <p:nvGrpSpPr>
-        <p:cNvPr id="1" name=""/>
-        <p:cNvGrpSpPr/>
-        <p:nvPr/>
-      </p:nvGrpSpPr>
-      <p:grpSpPr>
-        <a:xfrm>
-          <a:off x="0" y="0"/>
-          <a:ext cx="0" cy="0"/>
-          <a:chOff x="0" y="0"/>
-          <a:chExt cx="0" cy="0"/>
-        </a:xfrm>
-      </p:grpSpPr>
-      <p:sp>
-        <p:nvSpPr>
-          <p:cNvPr id="2" name="TextBox 1">
-            <a:extLst>
-              <a:ext uri="{FF2B5EF4-FFF2-40B4-BE49-F238E27FC236}">
-                <a16:creationId xmlns:a16="http://schemas.microsoft.com/office/drawing/2014/main" id="{66318393-290B-9988-E19D-E734521967BA}"/>
-              </a:ext>
-            </a:extLst>
-          </p:cNvPr>
-          <p:cNvSpPr txBox="1"/>
-          <p:nvPr/>
-        </p:nvSpPr>
-        <p:spPr>
-          <a:xfrm>
-            <a:off x="26948" y="4677036"/>
-            <a:ext cx="6831052" cy="4893647"/>
-          </a:xfrm>
-          <a:prstGeom prst="rect">
-            <a:avLst/>
-          </a:prstGeom>
-          <a:noFill/>
-        </p:spPr>
-        <p:txBody>
-          <a:bodyPr wrap="square" rtlCol="0">
-            <a:spAutoFit/>
-          </a:bodyPr>
-          <a:lstStyle/>
-          <a:p>
-            <a:r>
-              <a:rPr lang="en-GB" sz="1200" b="1" dirty="0">
-                <a:latin typeface="Arial" panose="020B0604020202020204" pitchFamily="34" charset="0"/>
-                <a:cs typeface="Arial" panose="020B0604020202020204" pitchFamily="34" charset="0"/>
-              </a:rPr>
-              <a:t>Fig. 3. GO and KEGG Enrichment Analyses: Bin of interest versus Decoy bins</a:t>
-            </a:r>
-          </a:p>
-          <a:p>
-            <a:endParaRPr lang="en-GB" sz="1200" b="1" dirty="0">
-              <a:latin typeface="Arial" panose="020B0604020202020204" pitchFamily="34" charset="0"/>
-              <a:cs typeface="Arial" panose="020B0604020202020204" pitchFamily="34" charset="0"/>
-            </a:endParaRPr>
-          </a:p>
-          <a:p>
-            <a:pPr marL="171450" indent="-171450">
-              <a:buFontTx/>
-              <a:buChar char="-"/>
-            </a:pPr>
-            <a:r>
-              <a:rPr lang="en-GB" sz="1200" b="1" dirty="0">
-                <a:latin typeface="Arial" panose="020B0604020202020204" pitchFamily="34" charset="0"/>
-                <a:cs typeface="Arial" panose="020B0604020202020204" pitchFamily="34" charset="0"/>
-              </a:rPr>
-              <a:t>No significantly enriched terms (</a:t>
-            </a:r>
-            <a:r>
-              <a:rPr lang="en-GB" sz="1200" b="1" dirty="0" err="1">
-                <a:latin typeface="Arial" panose="020B0604020202020204" pitchFamily="34" charset="0"/>
-                <a:cs typeface="Arial" panose="020B0604020202020204" pitchFamily="34" charset="0"/>
-              </a:rPr>
-              <a:t>padj</a:t>
-            </a:r>
-            <a:r>
-              <a:rPr lang="en-GB" sz="1200" b="1" dirty="0">
-                <a:latin typeface="Arial" panose="020B0604020202020204" pitchFamily="34" charset="0"/>
-                <a:cs typeface="Arial" panose="020B0604020202020204" pitchFamily="34" charset="0"/>
-              </a:rPr>
-              <a:t>&lt;0.05) in bin of interest</a:t>
-            </a:r>
-          </a:p>
-          <a:p>
-            <a:pPr marL="171450" indent="-171450">
-              <a:buFontTx/>
-              <a:buChar char="-"/>
-            </a:pPr>
-            <a:endParaRPr lang="en-GB" sz="1200" b="1" dirty="0">
-              <a:latin typeface="Arial" panose="020B0604020202020204" pitchFamily="34" charset="0"/>
-              <a:cs typeface="Arial" panose="020B0604020202020204" pitchFamily="34" charset="0"/>
-            </a:endParaRPr>
-          </a:p>
-          <a:p>
-            <a:pPr marL="171450" indent="-171450">
-              <a:buFontTx/>
-              <a:buChar char="-"/>
-            </a:pPr>
-            <a:r>
-              <a:rPr lang="en-GB" sz="1200" b="1" dirty="0">
-                <a:latin typeface="Arial" panose="020B0604020202020204" pitchFamily="34" charset="0"/>
-                <a:cs typeface="Arial" panose="020B0604020202020204" pitchFamily="34" charset="0"/>
-              </a:rPr>
-              <a:t> bin to the left – ECM and </a:t>
-            </a:r>
-            <a:r>
-              <a:rPr lang="en-GB" sz="1200" b="1" dirty="0" err="1">
-                <a:latin typeface="Arial" panose="020B0604020202020204" pitchFamily="34" charset="0"/>
-                <a:cs typeface="Arial" panose="020B0604020202020204" pitchFamily="34" charset="0"/>
-              </a:rPr>
-              <a:t>golgi</a:t>
-            </a:r>
-            <a:r>
-              <a:rPr lang="en-GB" sz="1200" b="1" dirty="0">
-                <a:latin typeface="Arial" panose="020B0604020202020204" pitchFamily="34" charset="0"/>
-                <a:cs typeface="Arial" panose="020B0604020202020204" pitchFamily="34" charset="0"/>
-              </a:rPr>
-              <a:t>-related CC terms significant, but small counts (2-4 proteins)</a:t>
-            </a:r>
-          </a:p>
-          <a:p>
-            <a:endParaRPr lang="en-GB" sz="1200" b="1" dirty="0">
-              <a:latin typeface="Arial" panose="020B0604020202020204" pitchFamily="34" charset="0"/>
-              <a:cs typeface="Arial" panose="020B0604020202020204" pitchFamily="34" charset="0"/>
-            </a:endParaRPr>
-          </a:p>
-          <a:p>
-            <a:pPr marL="171450" indent="-171450">
-              <a:buFontTx/>
-              <a:buChar char="-"/>
-            </a:pPr>
-            <a:r>
-              <a:rPr lang="en-GB" sz="1200" b="1" dirty="0">
-                <a:latin typeface="Arial" panose="020B0604020202020204" pitchFamily="34" charset="0"/>
-                <a:cs typeface="Arial" panose="020B0604020202020204" pitchFamily="34" charset="0"/>
-              </a:rPr>
-              <a:t>DECOY1 – multiple significant terms across the board; MF: binding, </a:t>
-            </a:r>
-            <a:r>
-              <a:rPr lang="en-GB" sz="1200" b="1" dirty="0" err="1">
-                <a:latin typeface="Arial" panose="020B0604020202020204" pitchFamily="34" charset="0"/>
-                <a:cs typeface="Arial" panose="020B0604020202020204" pitchFamily="34" charset="0"/>
-              </a:rPr>
-              <a:t>esp</a:t>
-            </a:r>
-            <a:r>
-              <a:rPr lang="en-GB" sz="1200" b="1" dirty="0">
-                <a:latin typeface="Arial" panose="020B0604020202020204" pitchFamily="34" charset="0"/>
-                <a:cs typeface="Arial" panose="020B0604020202020204" pitchFamily="34" charset="0"/>
-              </a:rPr>
-              <a:t> RNA binding; BP – fewer significant terms, mostly linked to regulation of RNA and mRNA splicing and processing; CC – once again </a:t>
-            </a:r>
-            <a:r>
-              <a:rPr lang="en-GB" sz="1200" b="1" dirty="0" err="1">
-                <a:latin typeface="Arial" panose="020B0604020202020204" pitchFamily="34" charset="0"/>
-                <a:cs typeface="Arial" panose="020B0604020202020204" pitchFamily="34" charset="0"/>
-              </a:rPr>
-              <a:t>spliceosomal</a:t>
-            </a:r>
-            <a:r>
-              <a:rPr lang="en-GB" sz="1200" b="1" dirty="0">
-                <a:latin typeface="Arial" panose="020B0604020202020204" pitchFamily="34" charset="0"/>
-                <a:cs typeface="Arial" panose="020B0604020202020204" pitchFamily="34" charset="0"/>
-              </a:rPr>
-              <a:t> complex/RNA complex; </a:t>
-            </a:r>
-          </a:p>
-          <a:p>
-            <a:r>
-              <a:rPr lang="en-GB" sz="1200" b="1" dirty="0">
-                <a:latin typeface="Arial" panose="020B0604020202020204" pitchFamily="34" charset="0"/>
-                <a:cs typeface="Arial" panose="020B0604020202020204" pitchFamily="34" charset="0"/>
-              </a:rPr>
-              <a:t>KEGG – spliceosome (but p </a:t>
-            </a:r>
-            <a:r>
-              <a:rPr lang="en-GB" sz="1200" b="1" dirty="0" err="1">
-                <a:latin typeface="Arial" panose="020B0604020202020204" pitchFamily="34" charset="0"/>
-                <a:cs typeface="Arial" panose="020B0604020202020204" pitchFamily="34" charset="0"/>
-              </a:rPr>
-              <a:t>adj</a:t>
-            </a:r>
-            <a:r>
-              <a:rPr lang="en-GB" sz="1200" b="1" dirty="0">
-                <a:latin typeface="Arial" panose="020B0604020202020204" pitchFamily="34" charset="0"/>
-                <a:cs typeface="Arial" panose="020B0604020202020204" pitchFamily="34" charset="0"/>
-              </a:rPr>
-              <a:t> not significant)</a:t>
-            </a:r>
-          </a:p>
-          <a:p>
-            <a:r>
-              <a:rPr lang="en-GB" sz="1200" b="1" dirty="0">
-                <a:latin typeface="Arial" panose="020B0604020202020204" pitchFamily="34" charset="0"/>
-                <a:cs typeface="Arial" panose="020B0604020202020204" pitchFamily="34" charset="0"/>
-              </a:rPr>
-              <a:t> </a:t>
-            </a:r>
-          </a:p>
-          <a:p>
-            <a:endParaRPr lang="en-GB" sz="1200" b="1" dirty="0">
-              <a:latin typeface="Arial" panose="020B0604020202020204" pitchFamily="34" charset="0"/>
-              <a:cs typeface="Arial" panose="020B0604020202020204" pitchFamily="34" charset="0"/>
-            </a:endParaRPr>
-          </a:p>
-          <a:p>
-            <a:pPr marL="171450" indent="-171450">
-              <a:buFontTx/>
-              <a:buChar char="-"/>
-            </a:pPr>
-            <a:r>
-              <a:rPr lang="en-GB" sz="1200" b="1" dirty="0">
-                <a:latin typeface="Arial" panose="020B0604020202020204" pitchFamily="34" charset="0"/>
-                <a:cs typeface="Arial" panose="020B0604020202020204" pitchFamily="34" charset="0"/>
-              </a:rPr>
-              <a:t>DECOY2 – once again RNA-related terms but not the same as DECOY1 – MF: RNA binding – close to significant; </a:t>
-            </a:r>
-          </a:p>
-          <a:p>
-            <a:r>
-              <a:rPr lang="en-GB" sz="1200" b="1" dirty="0">
-                <a:latin typeface="Arial" panose="020B0604020202020204" pitchFamily="34" charset="0"/>
-                <a:cs typeface="Arial" panose="020B0604020202020204" pitchFamily="34" charset="0"/>
-              </a:rPr>
-              <a:t>BP and CC are not significant.</a:t>
-            </a:r>
-          </a:p>
-          <a:p>
-            <a:r>
-              <a:rPr lang="en-GB" sz="1200" b="1" dirty="0">
-                <a:latin typeface="Arial" panose="020B0604020202020204" pitchFamily="34" charset="0"/>
-                <a:cs typeface="Arial" panose="020B0604020202020204" pitchFamily="34" charset="0"/>
-              </a:rPr>
-              <a:t>BP:  positive regulation of RNA metabolic processes stands out together with neg regulation of translation; CC – intracellular protein-containing complex; KEGG – too few counts; </a:t>
-            </a:r>
-            <a:r>
-              <a:rPr lang="en-GB" sz="1200" b="1" dirty="0" err="1">
-                <a:latin typeface="Arial" panose="020B0604020202020204" pitchFamily="34" charset="0"/>
-                <a:cs typeface="Arial" panose="020B0604020202020204" pitchFamily="34" charset="0"/>
-              </a:rPr>
-              <a:t>insuling</a:t>
-            </a:r>
-            <a:r>
-              <a:rPr lang="en-GB" sz="1200" b="1" dirty="0">
-                <a:latin typeface="Arial" panose="020B0604020202020204" pitchFamily="34" charset="0"/>
-                <a:cs typeface="Arial" panose="020B0604020202020204" pitchFamily="34" charset="0"/>
-              </a:rPr>
-              <a:t> signalling most counts but less significant (no p </a:t>
-            </a:r>
-            <a:r>
-              <a:rPr lang="en-GB" sz="1200" b="1" dirty="0" err="1">
-                <a:latin typeface="Arial" panose="020B0604020202020204" pitchFamily="34" charset="0"/>
-                <a:cs typeface="Arial" panose="020B0604020202020204" pitchFamily="34" charset="0"/>
-              </a:rPr>
-              <a:t>adj</a:t>
-            </a:r>
-            <a:r>
-              <a:rPr lang="en-GB" sz="1200" b="1" dirty="0">
-                <a:latin typeface="Arial" panose="020B0604020202020204" pitchFamily="34" charset="0"/>
-                <a:cs typeface="Arial" panose="020B0604020202020204" pitchFamily="34" charset="0"/>
-              </a:rPr>
-              <a:t> significant hits anyway)</a:t>
-            </a:r>
-          </a:p>
-          <a:p>
-            <a:endParaRPr lang="en-GB" sz="1200" b="1" dirty="0">
-              <a:latin typeface="Arial" panose="020B0604020202020204" pitchFamily="34" charset="0"/>
-              <a:cs typeface="Arial" panose="020B0604020202020204" pitchFamily="34" charset="0"/>
-            </a:endParaRPr>
-          </a:p>
-          <a:p>
-            <a:pPr marL="171450" indent="-171450">
-              <a:buFontTx/>
-              <a:buChar char="-"/>
-            </a:pPr>
-            <a:r>
-              <a:rPr lang="en-GB" sz="1200" b="1" dirty="0">
-                <a:latin typeface="Arial" panose="020B0604020202020204" pitchFamily="34" charset="0"/>
-                <a:cs typeface="Arial" panose="020B0604020202020204" pitchFamily="34" charset="0"/>
-              </a:rPr>
-              <a:t>DECOY3</a:t>
-            </a:r>
-          </a:p>
-          <a:p>
-            <a:r>
-              <a:rPr lang="en-GB" sz="1200" b="1" dirty="0">
-                <a:latin typeface="Arial" panose="020B0604020202020204" pitchFamily="34" charset="0"/>
-                <a:cs typeface="Arial" panose="020B0604020202020204" pitchFamily="34" charset="0"/>
-              </a:rPr>
-              <a:t>MF: RNA binding; </a:t>
-            </a:r>
-          </a:p>
-          <a:p>
-            <a:r>
-              <a:rPr lang="en-GB" sz="1200" b="1" dirty="0">
-                <a:latin typeface="Arial" panose="020B0604020202020204" pitchFamily="34" charset="0"/>
-                <a:cs typeface="Arial" panose="020B0604020202020204" pitchFamily="34" charset="0"/>
-              </a:rPr>
-              <a:t>BP – close to sig – post transcriptional regulation of RNA expression</a:t>
-            </a:r>
-          </a:p>
-          <a:p>
-            <a:r>
-              <a:rPr lang="en-GB" sz="1200" b="1" dirty="0">
-                <a:latin typeface="Arial" panose="020B0604020202020204" pitchFamily="34" charset="0"/>
-                <a:cs typeface="Arial" panose="020B0604020202020204" pitchFamily="34" charset="0"/>
-              </a:rPr>
-              <a:t>CC: not significant, top term is ribonucleoprotein complex</a:t>
-            </a:r>
-          </a:p>
-          <a:p>
-            <a:r>
-              <a:rPr lang="en-GB" sz="1200" b="1" dirty="0">
-                <a:latin typeface="Arial" panose="020B0604020202020204" pitchFamily="34" charset="0"/>
-                <a:cs typeface="Arial" panose="020B0604020202020204" pitchFamily="34" charset="0"/>
-              </a:rPr>
-              <a:t>KEGG: no significant; top term is </a:t>
-            </a:r>
-            <a:r>
-              <a:rPr lang="en-GB" sz="1200" dirty="0"/>
-              <a:t>Amoebiasis</a:t>
-            </a:r>
-            <a:r>
-              <a:rPr lang="en-GB" sz="1200" b="1" dirty="0">
-                <a:latin typeface="Arial" panose="020B0604020202020204" pitchFamily="34" charset="0"/>
-                <a:cs typeface="Arial" panose="020B0604020202020204" pitchFamily="34" charset="0"/>
-              </a:rPr>
-              <a:t> (n = 4 proteins, p&lt;0.01 but </a:t>
-            </a:r>
-            <a:r>
-              <a:rPr lang="en-GB" sz="1200" b="1" dirty="0" err="1">
-                <a:latin typeface="Arial" panose="020B0604020202020204" pitchFamily="34" charset="0"/>
-                <a:cs typeface="Arial" panose="020B0604020202020204" pitchFamily="34" charset="0"/>
-              </a:rPr>
-              <a:t>padj</a:t>
-            </a:r>
-            <a:r>
-              <a:rPr lang="en-GB" sz="1200" b="1" dirty="0">
-                <a:latin typeface="Arial" panose="020B0604020202020204" pitchFamily="34" charset="0"/>
-                <a:cs typeface="Arial" panose="020B0604020202020204" pitchFamily="34" charset="0"/>
-              </a:rPr>
-              <a:t> not sign.) </a:t>
-            </a:r>
-          </a:p>
-        </p:txBody>
-      </p:sp>
-      <p:sp>
-        <p:nvSpPr>
-          <p:cNvPr id="4" name="TextBox 3">
-            <a:extLst>
-              <a:ext uri="{FF2B5EF4-FFF2-40B4-BE49-F238E27FC236}">
-                <a16:creationId xmlns:a16="http://schemas.microsoft.com/office/drawing/2014/main" id="{D44586E1-DD74-A7E6-43EC-189736BED7C0}"/>
-              </a:ext>
-            </a:extLst>
-          </p:cNvPr>
-          <p:cNvSpPr txBox="1"/>
-          <p:nvPr/>
-        </p:nvSpPr>
-        <p:spPr>
-          <a:xfrm>
-            <a:off x="26948" y="3798313"/>
-            <a:ext cx="6831052" cy="369332"/>
-          </a:xfrm>
-          <a:prstGeom prst="rect">
-            <a:avLst/>
-          </a:prstGeom>
-          <a:noFill/>
-        </p:spPr>
-        <p:txBody>
-          <a:bodyPr wrap="square">
-            <a:spAutoFit/>
-          </a:bodyPr>
-          <a:lstStyle/>
-          <a:p>
-            <a:endParaRPr lang="en-GB" dirty="0"/>
-          </a:p>
-        </p:txBody>
-      </p:sp>
-    </p:spTree>
-    <p:extLst>
-      <p:ext uri="{BB962C8B-B14F-4D97-AF65-F5344CB8AC3E}">
-        <p14:creationId xmlns:p14="http://schemas.microsoft.com/office/powerpoint/2010/main" val="3040612172"/>
-      </p:ext>
-    </p:extLst>
-  </p:cSld>
-  <p:clrMapOvr>
-    <a:masterClrMapping/>
-  </p:clrMapOvr>
-</p:sld>
-</file>
-
-<file path=ppt/slides/slide12.xml><?xml version="1.0" encoding="utf-8"?>
-<p:sld xmlns:a="http://schemas.openxmlformats.org/drawingml/2006/main" xmlns:r="http://schemas.openxmlformats.org/officeDocument/2006/relationships" xmlns:p="http://schemas.openxmlformats.org/presentationml/2006/main" show="0">
-  <p:cSld>
-    <p:spTree>
-      <p:nvGrpSpPr>
-        <p:cNvPr id="1" name=""/>
-        <p:cNvGrpSpPr/>
-        <p:nvPr/>
-      </p:nvGrpSpPr>
-      <p:grpSpPr>
-        <a:xfrm>
-          <a:off x="0" y="0"/>
-          <a:ext cx="0" cy="0"/>
-          <a:chOff x="0" y="0"/>
-          <a:chExt cx="0" cy="0"/>
-        </a:xfrm>
-      </p:grpSpPr>
-      <p:sp>
-        <p:nvSpPr>
-          <p:cNvPr id="2" name="TextBox 1">
-            <a:extLst>
-              <a:ext uri="{FF2B5EF4-FFF2-40B4-BE49-F238E27FC236}">
-                <a16:creationId xmlns:a16="http://schemas.microsoft.com/office/drawing/2014/main" id="{B6F6FA8D-43CD-A0EB-A34A-659EEAC90765}"/>
-              </a:ext>
-            </a:extLst>
-          </p:cNvPr>
-          <p:cNvSpPr txBox="1"/>
-          <p:nvPr/>
-        </p:nvSpPr>
-        <p:spPr>
-          <a:xfrm>
-            <a:off x="26948" y="2797114"/>
-            <a:ext cx="6831052" cy="5078313"/>
-          </a:xfrm>
-          <a:prstGeom prst="rect">
-            <a:avLst/>
-          </a:prstGeom>
-          <a:noFill/>
-        </p:spPr>
-        <p:txBody>
-          <a:bodyPr wrap="square" rtlCol="0">
-            <a:spAutoFit/>
-          </a:bodyPr>
-          <a:lstStyle/>
-          <a:p>
-            <a:r>
-              <a:rPr lang="en-GB" sz="1200" b="1" dirty="0">
-                <a:latin typeface="Arial" panose="020B0604020202020204" pitchFamily="34" charset="0"/>
-                <a:cs typeface="Arial" panose="020B0604020202020204" pitchFamily="34" charset="0"/>
-              </a:rPr>
-              <a:t>Fig. 3. GO and KEGG Enrichment Analyses: Bin of interest versus Decoy bins</a:t>
-            </a:r>
-          </a:p>
-          <a:p>
-            <a:endParaRPr lang="en-GB" sz="1200" b="1" dirty="0">
-              <a:latin typeface="Arial" panose="020B0604020202020204" pitchFamily="34" charset="0"/>
-              <a:cs typeface="Arial" panose="020B0604020202020204" pitchFamily="34" charset="0"/>
-            </a:endParaRPr>
-          </a:p>
-          <a:p>
-            <a:pPr marL="171450" indent="-171450">
-              <a:buFontTx/>
-              <a:buChar char="-"/>
-            </a:pPr>
-            <a:r>
-              <a:rPr lang="en-GB" sz="1200" b="1" dirty="0">
-                <a:latin typeface="Arial" panose="020B0604020202020204" pitchFamily="34" charset="0"/>
-                <a:cs typeface="Arial" panose="020B0604020202020204" pitchFamily="34" charset="0"/>
-              </a:rPr>
-              <a:t>BOI MF integrin binding</a:t>
-            </a:r>
-          </a:p>
-          <a:p>
-            <a:r>
-              <a:rPr lang="en-GB" sz="1200" b="1" dirty="0">
-                <a:latin typeface="Arial" panose="020B0604020202020204" pitchFamily="34" charset="0"/>
-                <a:cs typeface="Arial" panose="020B0604020202020204" pitchFamily="34" charset="0"/>
-              </a:rPr>
-              <a:t>CC and BP – </a:t>
-            </a:r>
-            <a:r>
-              <a:rPr lang="en-GB" sz="1200" b="1" dirty="0" err="1">
-                <a:latin typeface="Arial" panose="020B0604020202020204" pitchFamily="34" charset="0"/>
-                <a:cs typeface="Arial" panose="020B0604020202020204" pitchFamily="34" charset="0"/>
-              </a:rPr>
-              <a:t>n.s</a:t>
-            </a:r>
-            <a:r>
-              <a:rPr lang="en-GB" sz="1200" b="1" dirty="0">
-                <a:latin typeface="Arial" panose="020B0604020202020204" pitchFamily="34" charset="0"/>
-                <a:cs typeface="Arial" panose="020B0604020202020204" pitchFamily="34" charset="0"/>
-              </a:rPr>
-              <a:t>. (q&gt;0.1)</a:t>
-            </a:r>
-          </a:p>
-          <a:p>
-            <a:endParaRPr lang="en-GB" sz="1200" b="1" dirty="0">
-              <a:latin typeface="Arial" panose="020B0604020202020204" pitchFamily="34" charset="0"/>
-              <a:cs typeface="Arial" panose="020B0604020202020204" pitchFamily="34" charset="0"/>
-            </a:endParaRPr>
-          </a:p>
-          <a:p>
-            <a:r>
-              <a:rPr lang="en-GB" sz="1200" b="1" dirty="0">
-                <a:latin typeface="Arial" panose="020B0604020202020204" pitchFamily="34" charset="0"/>
-                <a:cs typeface="Arial" panose="020B0604020202020204" pitchFamily="34" charset="0"/>
-              </a:rPr>
-              <a:t>- DM: – ECM and </a:t>
-            </a:r>
-            <a:r>
-              <a:rPr lang="en-GB" sz="1200" b="1" dirty="0" err="1">
-                <a:latin typeface="Arial" panose="020B0604020202020204" pitchFamily="34" charset="0"/>
-                <a:cs typeface="Arial" panose="020B0604020202020204" pitchFamily="34" charset="0"/>
-              </a:rPr>
-              <a:t>golgi</a:t>
-            </a:r>
-            <a:r>
-              <a:rPr lang="en-GB" sz="1200" b="1" dirty="0">
-                <a:latin typeface="Arial" panose="020B0604020202020204" pitchFamily="34" charset="0"/>
-                <a:cs typeface="Arial" panose="020B0604020202020204" pitchFamily="34" charset="0"/>
-              </a:rPr>
-              <a:t>-related CC terms significant, but small counts (2-4 proteins)</a:t>
-            </a:r>
-          </a:p>
-          <a:p>
-            <a:endParaRPr lang="en-GB" sz="1200" b="1" dirty="0">
-              <a:latin typeface="Arial" panose="020B0604020202020204" pitchFamily="34" charset="0"/>
-              <a:cs typeface="Arial" panose="020B0604020202020204" pitchFamily="34" charset="0"/>
-            </a:endParaRPr>
-          </a:p>
-          <a:p>
-            <a:endParaRPr lang="en-GB" sz="1200" b="1" dirty="0">
-              <a:latin typeface="Arial" panose="020B0604020202020204" pitchFamily="34" charset="0"/>
-              <a:cs typeface="Arial" panose="020B0604020202020204" pitchFamily="34" charset="0"/>
-            </a:endParaRPr>
-          </a:p>
-          <a:p>
-            <a:pPr marL="171450" indent="-171450">
-              <a:buFontTx/>
-              <a:buChar char="-"/>
-            </a:pPr>
-            <a:r>
-              <a:rPr lang="en-GB" sz="1200" b="1" dirty="0">
-                <a:latin typeface="Arial" panose="020B0604020202020204" pitchFamily="34" charset="0"/>
-                <a:cs typeface="Arial" panose="020B0604020202020204" pitchFamily="34" charset="0"/>
-              </a:rPr>
-              <a:t>DECOY1 – multiple significant terms across the board; MF: binding, </a:t>
-            </a:r>
-            <a:r>
-              <a:rPr lang="en-GB" sz="1200" b="1" dirty="0" err="1">
-                <a:latin typeface="Arial" panose="020B0604020202020204" pitchFamily="34" charset="0"/>
-                <a:cs typeface="Arial" panose="020B0604020202020204" pitchFamily="34" charset="0"/>
-              </a:rPr>
-              <a:t>esp</a:t>
-            </a:r>
-            <a:r>
-              <a:rPr lang="en-GB" sz="1200" b="1" dirty="0">
-                <a:latin typeface="Arial" panose="020B0604020202020204" pitchFamily="34" charset="0"/>
-                <a:cs typeface="Arial" panose="020B0604020202020204" pitchFamily="34" charset="0"/>
-              </a:rPr>
-              <a:t> RNA binding; BP – fewer significant terms, mostly linked to regulation of RNA and mRNA splicing and processing; CC – once again </a:t>
-            </a:r>
-            <a:r>
-              <a:rPr lang="en-GB" sz="1200" b="1" dirty="0" err="1">
-                <a:latin typeface="Arial" panose="020B0604020202020204" pitchFamily="34" charset="0"/>
-                <a:cs typeface="Arial" panose="020B0604020202020204" pitchFamily="34" charset="0"/>
-              </a:rPr>
-              <a:t>spliceosomal</a:t>
-            </a:r>
-            <a:r>
-              <a:rPr lang="en-GB" sz="1200" b="1" dirty="0">
-                <a:latin typeface="Arial" panose="020B0604020202020204" pitchFamily="34" charset="0"/>
-                <a:cs typeface="Arial" panose="020B0604020202020204" pitchFamily="34" charset="0"/>
-              </a:rPr>
-              <a:t> complex/RNA complex; </a:t>
-            </a:r>
-          </a:p>
-          <a:p>
-            <a:r>
-              <a:rPr lang="en-GB" sz="1200" b="1" dirty="0">
-                <a:latin typeface="Arial" panose="020B0604020202020204" pitchFamily="34" charset="0"/>
-                <a:cs typeface="Arial" panose="020B0604020202020204" pitchFamily="34" charset="0"/>
-              </a:rPr>
-              <a:t>KEGG – spliceosome (but p </a:t>
-            </a:r>
-            <a:r>
-              <a:rPr lang="en-GB" sz="1200" b="1" dirty="0" err="1">
-                <a:latin typeface="Arial" panose="020B0604020202020204" pitchFamily="34" charset="0"/>
-                <a:cs typeface="Arial" panose="020B0604020202020204" pitchFamily="34" charset="0"/>
-              </a:rPr>
-              <a:t>adj</a:t>
-            </a:r>
-            <a:r>
-              <a:rPr lang="en-GB" sz="1200" b="1" dirty="0">
-                <a:latin typeface="Arial" panose="020B0604020202020204" pitchFamily="34" charset="0"/>
-                <a:cs typeface="Arial" panose="020B0604020202020204" pitchFamily="34" charset="0"/>
-              </a:rPr>
-              <a:t> not significant)</a:t>
-            </a:r>
-          </a:p>
-          <a:p>
-            <a:r>
-              <a:rPr lang="en-GB" sz="1200" b="1" dirty="0">
-                <a:latin typeface="Arial" panose="020B0604020202020204" pitchFamily="34" charset="0"/>
-                <a:cs typeface="Arial" panose="020B0604020202020204" pitchFamily="34" charset="0"/>
-              </a:rPr>
-              <a:t> </a:t>
-            </a:r>
-          </a:p>
-          <a:p>
-            <a:endParaRPr lang="en-GB" sz="1200" b="1" dirty="0">
-              <a:latin typeface="Arial" panose="020B0604020202020204" pitchFamily="34" charset="0"/>
-              <a:cs typeface="Arial" panose="020B0604020202020204" pitchFamily="34" charset="0"/>
-            </a:endParaRPr>
-          </a:p>
-          <a:p>
-            <a:pPr marL="171450" indent="-171450">
-              <a:buFontTx/>
-              <a:buChar char="-"/>
-            </a:pPr>
-            <a:r>
-              <a:rPr lang="en-GB" sz="1200" b="1" dirty="0">
-                <a:latin typeface="Arial" panose="020B0604020202020204" pitchFamily="34" charset="0"/>
-                <a:cs typeface="Arial" panose="020B0604020202020204" pitchFamily="34" charset="0"/>
-              </a:rPr>
-              <a:t>DECOY2 – once again RNA-related terms but not the same as DECOY1 – MF: RNA binding – kind of close to significant but not under q 0.1; </a:t>
-            </a:r>
-          </a:p>
-          <a:p>
-            <a:r>
-              <a:rPr lang="en-GB" sz="1200" b="1" dirty="0">
-                <a:latin typeface="Arial" panose="020B0604020202020204" pitchFamily="34" charset="0"/>
-                <a:cs typeface="Arial" panose="020B0604020202020204" pitchFamily="34" charset="0"/>
-              </a:rPr>
-              <a:t>BP and CC are not significant.</a:t>
-            </a:r>
-          </a:p>
-          <a:p>
-            <a:r>
-              <a:rPr lang="en-GB" sz="1200" b="1" dirty="0">
-                <a:latin typeface="Arial" panose="020B0604020202020204" pitchFamily="34" charset="0"/>
-                <a:cs typeface="Arial" panose="020B0604020202020204" pitchFamily="34" charset="0"/>
-              </a:rPr>
-              <a:t>BP:  positive regulation of RNA metabolic processes stands out together with neg regulation of translation; CC – intracellular protein-containing complex; KEGG – too few counts; </a:t>
-            </a:r>
-            <a:r>
-              <a:rPr lang="en-GB" sz="1200" b="1" dirty="0" err="1">
-                <a:latin typeface="Arial" panose="020B0604020202020204" pitchFamily="34" charset="0"/>
-                <a:cs typeface="Arial" panose="020B0604020202020204" pitchFamily="34" charset="0"/>
-              </a:rPr>
-              <a:t>insuling</a:t>
-            </a:r>
-            <a:r>
-              <a:rPr lang="en-GB" sz="1200" b="1" dirty="0">
-                <a:latin typeface="Arial" panose="020B0604020202020204" pitchFamily="34" charset="0"/>
-                <a:cs typeface="Arial" panose="020B0604020202020204" pitchFamily="34" charset="0"/>
-              </a:rPr>
-              <a:t> signalling most counts but less significant (no p </a:t>
-            </a:r>
-            <a:r>
-              <a:rPr lang="en-GB" sz="1200" b="1" dirty="0" err="1">
-                <a:latin typeface="Arial" panose="020B0604020202020204" pitchFamily="34" charset="0"/>
-                <a:cs typeface="Arial" panose="020B0604020202020204" pitchFamily="34" charset="0"/>
-              </a:rPr>
-              <a:t>adj</a:t>
-            </a:r>
-            <a:r>
-              <a:rPr lang="en-GB" sz="1200" b="1" dirty="0">
-                <a:latin typeface="Arial" panose="020B0604020202020204" pitchFamily="34" charset="0"/>
-                <a:cs typeface="Arial" panose="020B0604020202020204" pitchFamily="34" charset="0"/>
-              </a:rPr>
-              <a:t> significant hits anyway)</a:t>
-            </a:r>
-          </a:p>
-          <a:p>
-            <a:endParaRPr lang="en-GB" sz="1200" b="1" dirty="0">
-              <a:latin typeface="Arial" panose="020B0604020202020204" pitchFamily="34" charset="0"/>
-              <a:cs typeface="Arial" panose="020B0604020202020204" pitchFamily="34" charset="0"/>
-            </a:endParaRPr>
-          </a:p>
-          <a:p>
-            <a:pPr marL="171450" indent="-171450">
-              <a:buFontTx/>
-              <a:buChar char="-"/>
-            </a:pPr>
-            <a:r>
-              <a:rPr lang="en-GB" sz="1200" b="1" dirty="0">
-                <a:latin typeface="Arial" panose="020B0604020202020204" pitchFamily="34" charset="0"/>
-                <a:cs typeface="Arial" panose="020B0604020202020204" pitchFamily="34" charset="0"/>
-              </a:rPr>
-              <a:t>DECOY3</a:t>
-            </a:r>
-          </a:p>
-          <a:p>
-            <a:r>
-              <a:rPr lang="en-GB" sz="1200" b="1" dirty="0">
-                <a:latin typeface="Arial" panose="020B0604020202020204" pitchFamily="34" charset="0"/>
-                <a:cs typeface="Arial" panose="020B0604020202020204" pitchFamily="34" charset="0"/>
-              </a:rPr>
-              <a:t>MF: RNA binding; </a:t>
-            </a:r>
-          </a:p>
-          <a:p>
-            <a:r>
-              <a:rPr lang="en-GB" sz="1200" b="1" dirty="0">
-                <a:latin typeface="Arial" panose="020B0604020202020204" pitchFamily="34" charset="0"/>
-                <a:cs typeface="Arial" panose="020B0604020202020204" pitchFamily="34" charset="0"/>
-              </a:rPr>
-              <a:t>BP – close to sig – post transcriptional regulation of RNA expression q 0.08</a:t>
-            </a:r>
-          </a:p>
-          <a:p>
-            <a:r>
-              <a:rPr lang="en-GB" sz="1200" b="1" dirty="0">
-                <a:latin typeface="Arial" panose="020B0604020202020204" pitchFamily="34" charset="0"/>
-                <a:cs typeface="Arial" panose="020B0604020202020204" pitchFamily="34" charset="0"/>
-              </a:rPr>
-              <a:t>CC: not significant, top term is ribonucleoprotein complex q ~ 0.1</a:t>
-            </a:r>
-          </a:p>
-          <a:p>
-            <a:r>
-              <a:rPr lang="en-GB" sz="1200" b="1" dirty="0">
-                <a:latin typeface="Arial" panose="020B0604020202020204" pitchFamily="34" charset="0"/>
-                <a:cs typeface="Arial" panose="020B0604020202020204" pitchFamily="34" charset="0"/>
-              </a:rPr>
-              <a:t>KEGG: no significant; top term is </a:t>
-            </a:r>
-            <a:r>
-              <a:rPr lang="en-GB" sz="1200" dirty="0"/>
-              <a:t>Amoebiasis</a:t>
-            </a:r>
-            <a:r>
-              <a:rPr lang="en-GB" sz="1200" b="1" dirty="0">
-                <a:latin typeface="Arial" panose="020B0604020202020204" pitchFamily="34" charset="0"/>
-                <a:cs typeface="Arial" panose="020B0604020202020204" pitchFamily="34" charset="0"/>
-              </a:rPr>
-              <a:t> (n = 4 proteins, p&lt;0.01 but </a:t>
-            </a:r>
-            <a:r>
-              <a:rPr lang="en-GB" sz="1200" b="1" dirty="0" err="1">
-                <a:latin typeface="Arial" panose="020B0604020202020204" pitchFamily="34" charset="0"/>
-                <a:cs typeface="Arial" panose="020B0604020202020204" pitchFamily="34" charset="0"/>
-              </a:rPr>
-              <a:t>padj</a:t>
-            </a:r>
-            <a:r>
-              <a:rPr lang="en-GB" sz="1200" b="1" dirty="0">
-                <a:latin typeface="Arial" panose="020B0604020202020204" pitchFamily="34" charset="0"/>
-                <a:cs typeface="Arial" panose="020B0604020202020204" pitchFamily="34" charset="0"/>
-              </a:rPr>
-              <a:t> not sign.) </a:t>
-            </a:r>
-          </a:p>
-        </p:txBody>
-      </p:sp>
-    </p:spTree>
-    <p:extLst>
-      <p:ext uri="{BB962C8B-B14F-4D97-AF65-F5344CB8AC3E}">
-        <p14:creationId xmlns:p14="http://schemas.microsoft.com/office/powerpoint/2010/main" val="3264622325"/>
       </p:ext>
     </p:extLst>
   </p:cSld>

</xml_diff>